<commit_message>
allow CSS files in SpringSecurity
</commit_message>
<xml_diff>
--- a/Barvy web.pptx
+++ b/Barvy web.pptx
@@ -106,6 +106,11 @@
       </a:defRPr>
     </a:lvl9pPr>
   </p:defaultTextStyle>
+  <p:extLst>
+    <p:ext uri="{EFAFB233-063F-42B5-8137-9DF3F51BA10A}">
+      <p15:sldGuideLst xmlns:p15="http://schemas.microsoft.com/office/powerpoint/2012/main"/>
+    </p:ext>
+  </p:extLst>
 </p:presentation>
 </file>
 
@@ -5992,6 +5997,100 @@
               </a:rPr>
               <a:t>#bc4749</a:t>
             </a:r>
+          </a:p>
+        </p:txBody>
+      </p:sp>
+      <p:sp>
+        <p:nvSpPr>
+          <p:cNvPr id="2" name="Obdélník 1">
+            <a:extLst>
+              <a:ext uri="{FF2B5EF4-FFF2-40B4-BE49-F238E27FC236}">
+                <a16:creationId xmlns:a16="http://schemas.microsoft.com/office/drawing/2014/main" id="{D428A675-491C-2BAF-C3CC-BE32EB8AF9C0}"/>
+              </a:ext>
+            </a:extLst>
+          </p:cNvPr>
+          <p:cNvSpPr/>
+          <p:nvPr/>
+        </p:nvSpPr>
+        <p:spPr>
+          <a:xfrm>
+            <a:off x="7182815" y="2524432"/>
+            <a:ext cx="1543664" cy="904568"/>
+          </a:xfrm>
+          <a:prstGeom prst="rect">
+            <a:avLst/>
+          </a:prstGeom>
+          <a:solidFill>
+            <a:srgbClr val="ECF0F1"/>
+          </a:solidFill>
+          <a:ln>
+            <a:noFill/>
+          </a:ln>
+        </p:spPr>
+        <p:style>
+          <a:lnRef idx="2">
+            <a:schemeClr val="accent1">
+              <a:shade val="15000"/>
+            </a:schemeClr>
+          </a:lnRef>
+          <a:fillRef idx="1">
+            <a:schemeClr val="accent1"/>
+          </a:fillRef>
+          <a:effectRef idx="0">
+            <a:schemeClr val="accent1"/>
+          </a:effectRef>
+          <a:fontRef idx="minor">
+            <a:schemeClr val="lt1"/>
+          </a:fontRef>
+        </p:style>
+        <p:txBody>
+          <a:bodyPr rtlCol="0" anchor="ctr"/>
+          <a:lstStyle/>
+          <a:p>
+            <a:pPr algn="ctr"/>
+            <a:endParaRPr lang="cs-CZ"/>
+          </a:p>
+        </p:txBody>
+      </p:sp>
+      <p:sp>
+        <p:nvSpPr>
+          <p:cNvPr id="4" name="TextovéPole 3">
+            <a:extLst>
+              <a:ext uri="{FF2B5EF4-FFF2-40B4-BE49-F238E27FC236}">
+                <a16:creationId xmlns:a16="http://schemas.microsoft.com/office/drawing/2014/main" id="{F0FA6AFC-DD2D-275E-C43A-EA83FFC7F896}"/>
+              </a:ext>
+            </a:extLst>
+          </p:cNvPr>
+          <p:cNvSpPr txBox="1"/>
+          <p:nvPr/>
+        </p:nvSpPr>
+        <p:spPr>
+          <a:xfrm>
+            <a:off x="7522378" y="2792050"/>
+            <a:ext cx="1748589" cy="369332"/>
+          </a:xfrm>
+          <a:prstGeom prst="rect">
+            <a:avLst/>
+          </a:prstGeom>
+          <a:noFill/>
+        </p:spPr>
+        <p:txBody>
+          <a:bodyPr wrap="square">
+            <a:spAutoFit/>
+          </a:bodyPr>
+          <a:lstStyle/>
+          <a:p>
+            <a:r>
+              <a:rPr lang="cs-CZ" sz="1800" b="1" i="0" u="none" strike="noStrike" dirty="0">
+                <a:solidFill>
+                  <a:srgbClr val="000000"/>
+                </a:solidFill>
+                <a:effectLst/>
+                <a:latin typeface="Arial" panose="020B0604020202020204" pitchFamily="34" charset="0"/>
+              </a:rPr>
+              <a:t>#ecf0f1 </a:t>
+            </a:r>
+            <a:endParaRPr lang="cs-CZ" dirty="0"/>
           </a:p>
         </p:txBody>
       </p:sp>

</xml_diff>